<commit_message>
updated group funding information and logos
</commit_message>
<xml_diff>
--- a/Poster/research_poster_template_1_(four column).pptx
+++ b/Poster/research_poster_template_1_(four column).pptx
@@ -162,8 +162,8 @@
       <pc:docMk xmlns:pc="http://schemas.microsoft.com/office/powerpoint/2013/main/command"/>
       <pc:sldMk xmlns:pc="http://schemas.microsoft.com/office/powerpoint/2013/main/command" cId="1753148637" sldId="256"/>
       <ac:spMk id="7" creationId="{B23291F7-B96C-04A0-DF58-3B6DC6B38034}"/>
-      <ac:txMk cp="0" len="522">
-        <ac:context len="523" hash="3679429478"/>
+      <ac:txMk cp="0" len="225">
+        <ac:context len="226" hash="1192393549"/>
       </ac:txMk>
     </ac:txMkLst>
     <p188:pos x="21587619" y="1177147"/>
@@ -360,7 +360,7 @@
           <a:p>
             <a:fld id="{ACC69483-2065-824C-9173-E1AF42207651}" type="datetimeFigureOut">
               <a:rPr lang="en-US" smtClean="0"/>
-              <a:t>4/19/2025</a:t>
+              <a:t>7/25/2025</a:t>
             </a:fld>
             <a:endParaRPr lang="en-US"/>
           </a:p>
@@ -570,7 +570,7 @@
           <a:p>
             <a:fld id="{ACC69483-2065-824C-9173-E1AF42207651}" type="datetimeFigureOut">
               <a:rPr lang="en-US" smtClean="0"/>
-              <a:t>4/19/2025</a:t>
+              <a:t>7/25/2025</a:t>
             </a:fld>
             <a:endParaRPr lang="en-US"/>
           </a:p>
@@ -780,7 +780,7 @@
           <a:p>
             <a:fld id="{ACC69483-2065-824C-9173-E1AF42207651}" type="datetimeFigureOut">
               <a:rPr lang="en-US" smtClean="0"/>
-              <a:t>4/19/2025</a:t>
+              <a:t>7/25/2025</a:t>
             </a:fld>
             <a:endParaRPr lang="en-US"/>
           </a:p>
@@ -990,7 +990,7 @@
           <a:p>
             <a:fld id="{ACC69483-2065-824C-9173-E1AF42207651}" type="datetimeFigureOut">
               <a:rPr lang="en-US" smtClean="0"/>
-              <a:t>4/19/2025</a:t>
+              <a:t>7/25/2025</a:t>
             </a:fld>
             <a:endParaRPr lang="en-US"/>
           </a:p>
@@ -1264,7 +1264,7 @@
           <a:p>
             <a:fld id="{ACC69483-2065-824C-9173-E1AF42207651}" type="datetimeFigureOut">
               <a:rPr lang="en-US" smtClean="0"/>
-              <a:t>4/19/2025</a:t>
+              <a:t>7/25/2025</a:t>
             </a:fld>
             <a:endParaRPr lang="en-US"/>
           </a:p>
@@ -1534,7 +1534,7 @@
           <a:p>
             <a:fld id="{ACC69483-2065-824C-9173-E1AF42207651}" type="datetimeFigureOut">
               <a:rPr lang="en-US" smtClean="0"/>
-              <a:t>4/19/2025</a:t>
+              <a:t>7/25/2025</a:t>
             </a:fld>
             <a:endParaRPr lang="en-US"/>
           </a:p>
@@ -1940,7 +1940,7 @@
           <a:p>
             <a:fld id="{ACC69483-2065-824C-9173-E1AF42207651}" type="datetimeFigureOut">
               <a:rPr lang="en-US" smtClean="0"/>
-              <a:t>4/19/2025</a:t>
+              <a:t>7/25/2025</a:t>
             </a:fld>
             <a:endParaRPr lang="en-US"/>
           </a:p>
@@ -2090,7 +2090,7 @@
           <a:p>
             <a:fld id="{ACC69483-2065-824C-9173-E1AF42207651}" type="datetimeFigureOut">
               <a:rPr lang="en-US" smtClean="0"/>
-              <a:t>4/19/2025</a:t>
+              <a:t>7/25/2025</a:t>
             </a:fld>
             <a:endParaRPr lang="en-US"/>
           </a:p>
@@ -2209,7 +2209,7 @@
           <a:p>
             <a:fld id="{ACC69483-2065-824C-9173-E1AF42207651}" type="datetimeFigureOut">
               <a:rPr lang="en-US" smtClean="0"/>
-              <a:t>4/19/2025</a:t>
+              <a:t>7/25/2025</a:t>
             </a:fld>
             <a:endParaRPr lang="en-US"/>
           </a:p>
@@ -2519,7 +2519,7 @@
           <a:p>
             <a:fld id="{ACC69483-2065-824C-9173-E1AF42207651}" type="datetimeFigureOut">
               <a:rPr lang="en-US" smtClean="0"/>
-              <a:t>4/19/2025</a:t>
+              <a:t>7/25/2025</a:t>
             </a:fld>
             <a:endParaRPr lang="en-US"/>
           </a:p>
@@ -2809,7 +2809,7 @@
           <a:p>
             <a:fld id="{ACC69483-2065-824C-9173-E1AF42207651}" type="datetimeFigureOut">
               <a:rPr lang="en-US" smtClean="0"/>
-              <a:t>4/19/2025</a:t>
+              <a:t>7/25/2025</a:t>
             </a:fld>
             <a:endParaRPr lang="en-US"/>
           </a:p>
@@ -4308,7 +4308,7 @@
         <p:spPr bwMode="auto">
           <a:xfrm>
             <a:off x="1313945" y="29912453"/>
-            <a:ext cx="21487062" cy="4062651"/>
+            <a:ext cx="8134855" cy="4062651"/>
           </a:xfrm>
           <a:prstGeom prst="rect">
             <a:avLst/>
@@ -4336,7 +4336,7 @@
                 <a:latin typeface="Arial" panose="020B0604020202020204" pitchFamily="34" charset="0"/>
                 <a:cs typeface="Arial" panose="020B0604020202020204" pitchFamily="34" charset="0"/>
               </a:rPr>
-              <a:t>This material is based upon work supported by the Air Force Office of Scientific Research (AFOSR), United States through award no. FA9550-21-1-0083 and no. FA9550-21-1-0082. This work is also partly supported by the National Science Foundation, United States grant numbers 1850012, 1937535, and 1956071. Any opinions, findings, and conclusions or recommendations expressed in this material are those of the authors and do not necessarily reflect the views of the National Science Foundation or the United States Air Force.</a:t>
+              <a:t>This material is based upon work supported by the … [Reach out to Dr. Downey and he will get you the propter text for this. Only use the logos at the right that are mentioned, delete the non-relevant logos from your poster.].</a:t>
             </a:r>
           </a:p>
         </p:txBody>
@@ -4370,7 +4370,7 @@
         </p:blipFill>
         <p:spPr bwMode="auto">
           <a:xfrm>
-            <a:off x="23412572" y="30012724"/>
+            <a:off x="22188803" y="29860642"/>
             <a:ext cx="1865191" cy="1874940"/>
           </a:xfrm>
           <a:prstGeom prst="rect">
@@ -4417,10 +4417,241 @@
         </p:blipFill>
         <p:spPr bwMode="auto">
           <a:xfrm>
-            <a:off x="25707181" y="30012724"/>
-            <a:ext cx="1865191" cy="1865191"/>
+            <a:off x="24149352" y="30023865"/>
+            <a:ext cx="1801618" cy="1801618"/>
           </a:xfrm>
           <a:prstGeom prst="ellipse">
+            <a:avLst/>
+          </a:prstGeom>
+          <a:noFill/>
+          <a:extLst>
+            <a:ext uri="{909E8E84-426E-40DD-AFC4-6F175D3DCCD1}">
+              <a14:hiddenFill xmlns:a14="http://schemas.microsoft.com/office/drawing/2010/main">
+                <a:solidFill>
+                  <a:srgbClr val="FFFFFF"/>
+                </a:solidFill>
+              </a14:hiddenFill>
+            </a:ext>
+          </a:extLst>
+        </p:spPr>
+      </p:pic>
+      <p:pic>
+        <p:nvPicPr>
+          <p:cNvPr id="11" name="Picture 6">
+            <a:extLst>
+              <a:ext uri="{FF2B5EF4-FFF2-40B4-BE49-F238E27FC236}">
+                <a16:creationId xmlns:a16="http://schemas.microsoft.com/office/drawing/2014/main" id="{97245BDC-A290-3109-1ADB-333F87033623}"/>
+              </a:ext>
+            </a:extLst>
+          </p:cNvPr>
+          <p:cNvPicPr>
+            <a:picLocks noChangeAspect="1" noChangeArrowheads="1"/>
+          </p:cNvPicPr>
+          <p:nvPr/>
+        </p:nvPicPr>
+        <p:blipFill>
+          <a:blip r:embed="rId7">
+            <a:extLst>
+              <a:ext uri="{28A0092B-C50C-407E-A947-70E740481C1C}">
+                <a14:useLocalDpi xmlns:a14="http://schemas.microsoft.com/office/drawing/2010/main" val="0"/>
+              </a:ext>
+            </a:extLst>
+          </a:blip>
+          <a:srcRect/>
+          <a:stretch>
+            <a:fillRect/>
+          </a:stretch>
+        </p:blipFill>
+        <p:spPr bwMode="auto">
+          <a:xfrm>
+            <a:off x="18335141" y="29927970"/>
+            <a:ext cx="3786226" cy="1726435"/>
+          </a:xfrm>
+          <a:prstGeom prst="rect">
+            <a:avLst/>
+          </a:prstGeom>
+          <a:noFill/>
+          <a:extLst>
+            <a:ext uri="{909E8E84-426E-40DD-AFC4-6F175D3DCCD1}">
+              <a14:hiddenFill xmlns:a14="http://schemas.microsoft.com/office/drawing/2010/main">
+                <a:solidFill>
+                  <a:srgbClr val="FFFFFF"/>
+                </a:solidFill>
+              </a14:hiddenFill>
+            </a:ext>
+          </a:extLst>
+        </p:spPr>
+      </p:pic>
+      <p:pic>
+        <p:nvPicPr>
+          <p:cNvPr id="15" name="Picture 8">
+            <a:extLst>
+              <a:ext uri="{FF2B5EF4-FFF2-40B4-BE49-F238E27FC236}">
+                <a16:creationId xmlns:a16="http://schemas.microsoft.com/office/drawing/2014/main" id="{7E99E851-1644-65F5-EF49-867C50E359AC}"/>
+              </a:ext>
+            </a:extLst>
+          </p:cNvPr>
+          <p:cNvPicPr>
+            <a:picLocks noChangeAspect="1" noChangeArrowheads="1"/>
+          </p:cNvPicPr>
+          <p:nvPr/>
+        </p:nvPicPr>
+        <p:blipFill>
+          <a:blip r:embed="rId8">
+            <a:extLst>
+              <a:ext uri="{28A0092B-C50C-407E-A947-70E740481C1C}">
+                <a14:useLocalDpi xmlns:a14="http://schemas.microsoft.com/office/drawing/2010/main" val="0"/>
+              </a:ext>
+            </a:extLst>
+          </a:blip>
+          <a:srcRect/>
+          <a:stretch>
+            <a:fillRect/>
+          </a:stretch>
+        </p:blipFill>
+        <p:spPr bwMode="auto">
+          <a:xfrm>
+            <a:off x="26191719" y="30002975"/>
+            <a:ext cx="1801618" cy="1801618"/>
+          </a:xfrm>
+          <a:prstGeom prst="rect">
+            <a:avLst/>
+          </a:prstGeom>
+          <a:noFill/>
+          <a:extLst>
+            <a:ext uri="{909E8E84-426E-40DD-AFC4-6F175D3DCCD1}">
+              <a14:hiddenFill xmlns:a14="http://schemas.microsoft.com/office/drawing/2010/main">
+                <a:solidFill>
+                  <a:srgbClr val="FFFFFF"/>
+                </a:solidFill>
+              </a14:hiddenFill>
+            </a:ext>
+          </a:extLst>
+        </p:spPr>
+      </p:pic>
+      <p:pic>
+        <p:nvPicPr>
+          <p:cNvPr id="17" name="Picture 16" descr="A logo with a red and white circle&#10;&#10;AI-generated content may be incorrect.">
+            <a:extLst>
+              <a:ext uri="{FF2B5EF4-FFF2-40B4-BE49-F238E27FC236}">
+                <a16:creationId xmlns:a16="http://schemas.microsoft.com/office/drawing/2014/main" id="{294E61A2-91FB-3A41-ABDE-7FD4AD825075}"/>
+              </a:ext>
+            </a:extLst>
+          </p:cNvPr>
+          <p:cNvPicPr>
+            <a:picLocks noChangeAspect="1"/>
+          </p:cNvPicPr>
+          <p:nvPr/>
+        </p:nvPicPr>
+        <p:blipFill>
+          <a:blip r:embed="rId9"/>
+          <a:stretch>
+            <a:fillRect/>
+          </a:stretch>
+        </p:blipFill>
+        <p:spPr>
+          <a:xfrm>
+            <a:off x="11651442" y="29802383"/>
+            <a:ext cx="2448312" cy="2189417"/>
+          </a:xfrm>
+          <a:prstGeom prst="rect">
+            <a:avLst/>
+          </a:prstGeom>
+        </p:spPr>
+      </p:pic>
+      <p:pic>
+        <p:nvPicPr>
+          <p:cNvPr id="36" name="Picture 35" descr="A black and white logo&#10;&#10;AI-generated content may be incorrect.">
+            <a:extLst>
+              <a:ext uri="{FF2B5EF4-FFF2-40B4-BE49-F238E27FC236}">
+                <a16:creationId xmlns:a16="http://schemas.microsoft.com/office/drawing/2014/main" id="{119D532C-9EFC-70E9-288B-FD0751C55B4B}"/>
+              </a:ext>
+            </a:extLst>
+          </p:cNvPr>
+          <p:cNvPicPr>
+            <a:picLocks noChangeAspect="1"/>
+          </p:cNvPicPr>
+          <p:nvPr/>
+        </p:nvPicPr>
+        <p:blipFill>
+          <a:blip r:embed="rId10"/>
+          <a:stretch>
+            <a:fillRect/>
+          </a:stretch>
+        </p:blipFill>
+        <p:spPr>
+          <a:xfrm>
+            <a:off x="14019573" y="30015538"/>
+            <a:ext cx="4260895" cy="1937472"/>
+          </a:xfrm>
+          <a:prstGeom prst="rect">
+            <a:avLst/>
+          </a:prstGeom>
+        </p:spPr>
+      </p:pic>
+      <p:pic>
+        <p:nvPicPr>
+          <p:cNvPr id="40" name="Picture 39" descr="A blue and grey logo&#10;&#10;AI-generated content may be incorrect.">
+            <a:extLst>
+              <a:ext uri="{FF2B5EF4-FFF2-40B4-BE49-F238E27FC236}">
+                <a16:creationId xmlns:a16="http://schemas.microsoft.com/office/drawing/2014/main" id="{3ED34C1D-A665-6D0A-23AF-009BB895F247}"/>
+              </a:ext>
+            </a:extLst>
+          </p:cNvPr>
+          <p:cNvPicPr>
+            <a:picLocks noChangeAspect="1"/>
+          </p:cNvPicPr>
+          <p:nvPr/>
+        </p:nvPicPr>
+        <p:blipFill>
+          <a:blip r:embed="rId11"/>
+          <a:stretch>
+            <a:fillRect/>
+          </a:stretch>
+        </p:blipFill>
+        <p:spPr>
+          <a:xfrm>
+            <a:off x="28302836" y="30058600"/>
+            <a:ext cx="5159945" cy="1676982"/>
+          </a:xfrm>
+          <a:prstGeom prst="rect">
+            <a:avLst/>
+          </a:prstGeom>
+        </p:spPr>
+      </p:pic>
+      <p:pic>
+        <p:nvPicPr>
+          <p:cNvPr id="1026" name="Picture 2" descr="SC Space Grant Consortium">
+            <a:extLst>
+              <a:ext uri="{FF2B5EF4-FFF2-40B4-BE49-F238E27FC236}">
+                <a16:creationId xmlns:a16="http://schemas.microsoft.com/office/drawing/2014/main" id="{34D14459-C9D4-FAD7-3139-AAFAD49E308D}"/>
+              </a:ext>
+            </a:extLst>
+          </p:cNvPr>
+          <p:cNvPicPr>
+            <a:picLocks noChangeAspect="1" noChangeArrowheads="1"/>
+          </p:cNvPicPr>
+          <p:nvPr/>
+        </p:nvPicPr>
+        <p:blipFill>
+          <a:blip r:embed="rId12">
+            <a:extLst>
+              <a:ext uri="{28A0092B-C50C-407E-A947-70E740481C1C}">
+                <a14:useLocalDpi xmlns:a14="http://schemas.microsoft.com/office/drawing/2010/main" val="0"/>
+              </a:ext>
+            </a:extLst>
+          </a:blip>
+          <a:srcRect/>
+          <a:stretch>
+            <a:fillRect/>
+          </a:stretch>
+        </p:blipFill>
+        <p:spPr bwMode="auto">
+          <a:xfrm>
+            <a:off x="9860016" y="29861564"/>
+            <a:ext cx="1757708" cy="1963919"/>
+          </a:xfrm>
+          <a:prstGeom prst="rect">
             <a:avLst/>
           </a:prstGeom>
           <a:noFill/>

</xml_diff>

<commit_message>
updates to group poster formats
</commit_message>
<xml_diff>
--- a/Poster/research_poster_template_1_(four column).pptx
+++ b/Poster/research_poster_template_1_(four column).pptx
@@ -360,7 +360,7 @@
           <a:p>
             <a:fld id="{ACC69483-2065-824C-9173-E1AF42207651}" type="datetimeFigureOut">
               <a:rPr lang="en-US" smtClean="0"/>
-              <a:t>7/25/2025</a:t>
+              <a:t>7/28/2025</a:t>
             </a:fld>
             <a:endParaRPr lang="en-US"/>
           </a:p>
@@ -570,7 +570,7 @@
           <a:p>
             <a:fld id="{ACC69483-2065-824C-9173-E1AF42207651}" type="datetimeFigureOut">
               <a:rPr lang="en-US" smtClean="0"/>
-              <a:t>7/25/2025</a:t>
+              <a:t>7/28/2025</a:t>
             </a:fld>
             <a:endParaRPr lang="en-US"/>
           </a:p>
@@ -780,7 +780,7 @@
           <a:p>
             <a:fld id="{ACC69483-2065-824C-9173-E1AF42207651}" type="datetimeFigureOut">
               <a:rPr lang="en-US" smtClean="0"/>
-              <a:t>7/25/2025</a:t>
+              <a:t>7/28/2025</a:t>
             </a:fld>
             <a:endParaRPr lang="en-US"/>
           </a:p>
@@ -990,7 +990,7 @@
           <a:p>
             <a:fld id="{ACC69483-2065-824C-9173-E1AF42207651}" type="datetimeFigureOut">
               <a:rPr lang="en-US" smtClean="0"/>
-              <a:t>7/25/2025</a:t>
+              <a:t>7/28/2025</a:t>
             </a:fld>
             <a:endParaRPr lang="en-US"/>
           </a:p>
@@ -1264,7 +1264,7 @@
           <a:p>
             <a:fld id="{ACC69483-2065-824C-9173-E1AF42207651}" type="datetimeFigureOut">
               <a:rPr lang="en-US" smtClean="0"/>
-              <a:t>7/25/2025</a:t>
+              <a:t>7/28/2025</a:t>
             </a:fld>
             <a:endParaRPr lang="en-US"/>
           </a:p>
@@ -1534,7 +1534,7 @@
           <a:p>
             <a:fld id="{ACC69483-2065-824C-9173-E1AF42207651}" type="datetimeFigureOut">
               <a:rPr lang="en-US" smtClean="0"/>
-              <a:t>7/25/2025</a:t>
+              <a:t>7/28/2025</a:t>
             </a:fld>
             <a:endParaRPr lang="en-US"/>
           </a:p>
@@ -1940,7 +1940,7 @@
           <a:p>
             <a:fld id="{ACC69483-2065-824C-9173-E1AF42207651}" type="datetimeFigureOut">
               <a:rPr lang="en-US" smtClean="0"/>
-              <a:t>7/25/2025</a:t>
+              <a:t>7/28/2025</a:t>
             </a:fld>
             <a:endParaRPr lang="en-US"/>
           </a:p>
@@ -2090,7 +2090,7 @@
           <a:p>
             <a:fld id="{ACC69483-2065-824C-9173-E1AF42207651}" type="datetimeFigureOut">
               <a:rPr lang="en-US" smtClean="0"/>
-              <a:t>7/25/2025</a:t>
+              <a:t>7/28/2025</a:t>
             </a:fld>
             <a:endParaRPr lang="en-US"/>
           </a:p>
@@ -2209,7 +2209,7 @@
           <a:p>
             <a:fld id="{ACC69483-2065-824C-9173-E1AF42207651}" type="datetimeFigureOut">
               <a:rPr lang="en-US" smtClean="0"/>
-              <a:t>7/25/2025</a:t>
+              <a:t>7/28/2025</a:t>
             </a:fld>
             <a:endParaRPr lang="en-US"/>
           </a:p>
@@ -2519,7 +2519,7 @@
           <a:p>
             <a:fld id="{ACC69483-2065-824C-9173-E1AF42207651}" type="datetimeFigureOut">
               <a:rPr lang="en-US" smtClean="0"/>
-              <a:t>7/25/2025</a:t>
+              <a:t>7/28/2025</a:t>
             </a:fld>
             <a:endParaRPr lang="en-US"/>
           </a:p>
@@ -2809,7 +2809,7 @@
           <a:p>
             <a:fld id="{ACC69483-2065-824C-9173-E1AF42207651}" type="datetimeFigureOut">
               <a:rPr lang="en-US" smtClean="0"/>
-              <a:t>7/25/2025</a:t>
+              <a:t>7/28/2025</a:t>
             </a:fld>
             <a:endParaRPr lang="en-US"/>
           </a:p>
@@ -3333,7 +3333,14 @@
                 <a:latin typeface="Arial" panose="020B0604020202020204" pitchFamily="34" charset="0"/>
                 <a:cs typeface="Arial" panose="020B0604020202020204" pitchFamily="34" charset="0"/>
               </a:rPr>
-              <a:t>Authors and Co-authors</a:t>
+              <a:t>Author A, Author B, and Austin R.J. Downey</a:t>
+            </a:r>
+            <a:r>
+              <a:rPr lang="en-US" sz="8000" b="0" i="0" baseline="30000" dirty="0">
+                <a:latin typeface="Arial" panose="020B0604020202020204" pitchFamily="34" charset="0"/>
+                <a:cs typeface="Arial" panose="020B0604020202020204" pitchFamily="34" charset="0"/>
+              </a:rPr>
+              <a:t>1,2</a:t>
             </a:r>
           </a:p>
         </p:txBody>
@@ -3353,7 +3360,7 @@
         <p:spPr>
           <a:xfrm>
             <a:off x="1181351" y="3946305"/>
-            <a:ext cx="28490779" cy="707886"/>
+            <a:ext cx="28490779" cy="1938992"/>
           </a:xfrm>
           <a:prstGeom prst="rect">
             <a:avLst/>
@@ -3366,13 +3373,38 @@
           </a:bodyPr>
           <a:lstStyle/>
           <a:p>
+            <a:r>
+              <a:rPr lang="en-US" sz="4000" baseline="30000" dirty="0">
+                <a:latin typeface="Arial" panose="020B0604020202020204" pitchFamily="34" charset="0"/>
+                <a:cs typeface="Arial" panose="020B0604020202020204" pitchFamily="34" charset="0"/>
+              </a:rPr>
+              <a:t>1</a:t>
+            </a:r>
             <a:r>
               <a:rPr lang="en-US" sz="4000" dirty="0">
                 <a:latin typeface="Arial" panose="020B0604020202020204" pitchFamily="34" charset="0"/>
                 <a:cs typeface="Arial" panose="020B0604020202020204" pitchFamily="34" charset="0"/>
               </a:rPr>
-              <a:t>University of South Carolina, affiliations for other authors</a:t>
-            </a:r>
+              <a:t>Department of Mechanical Engineering, University of South Carolina</a:t>
+            </a:r>
+          </a:p>
+          <a:p>
+            <a:r>
+              <a:rPr lang="en-US" sz="4000" baseline="30000" dirty="0">
+                <a:latin typeface="Arial" panose="020B0604020202020204" pitchFamily="34" charset="0"/>
+                <a:cs typeface="Arial" panose="020B0604020202020204" pitchFamily="34" charset="0"/>
+              </a:rPr>
+              <a:t>2</a:t>
+            </a:r>
+            <a:r>
+              <a:rPr lang="en-US" sz="4000" dirty="0">
+                <a:latin typeface="Arial" panose="020B0604020202020204" pitchFamily="34" charset="0"/>
+                <a:cs typeface="Arial" panose="020B0604020202020204" pitchFamily="34" charset="0"/>
+              </a:rPr>
+              <a:t>Department of Civil and Environmental Engineering, University of South Carolina</a:t>
+            </a:r>
+          </a:p>
+          <a:p>
             <a:endParaRPr lang="en-US" sz="4000" b="0" i="0" dirty="0">
               <a:latin typeface="Arial" panose="020B0604020202020204" pitchFamily="34" charset="0"/>
               <a:cs typeface="Arial" panose="020B0604020202020204" pitchFamily="34" charset="0"/>
@@ -4664,6 +4696,36 @@
               </a14:hiddenFill>
             </a:ext>
           </a:extLst>
+        </p:spPr>
+      </p:pic>
+      <p:pic>
+        <p:nvPicPr>
+          <p:cNvPr id="10" name="Picture 9" descr="A black and white logo&#10;&#10;AI-generated content may be incorrect.">
+            <a:extLst>
+              <a:ext uri="{FF2B5EF4-FFF2-40B4-BE49-F238E27FC236}">
+                <a16:creationId xmlns:a16="http://schemas.microsoft.com/office/drawing/2014/main" id="{F77F3F7C-E1CE-6341-0564-1FB5256359BA}"/>
+              </a:ext>
+            </a:extLst>
+          </p:cNvPr>
+          <p:cNvPicPr>
+            <a:picLocks noChangeAspect="1"/>
+          </p:cNvPicPr>
+          <p:nvPr/>
+        </p:nvPicPr>
+        <p:blipFill>
+          <a:blip r:embed="rId13"/>
+          <a:stretch>
+            <a:fillRect/>
+          </a:stretch>
+        </p:blipFill>
+        <p:spPr>
+          <a:xfrm>
+            <a:off x="33498760" y="1846941"/>
+            <a:ext cx="8397433" cy="2700928"/>
+          </a:xfrm>
+          <a:prstGeom prst="rect">
+            <a:avLst/>
+          </a:prstGeom>
         </p:spPr>
       </p:pic>
     </p:spTree>

</xml_diff>